<commit_message>
Office: 2020. 8. 4 In the middle of defining permissions
</commit_message>
<xml_diff>
--- a/docs/Icecap.pptx
+++ b/docs/Icecap.pptx
@@ -5,14 +5,15 @@
     <p:sldMasterId id="2147483648" r:id="rId1"/>
   </p:sldMasterIdLst>
   <p:sldIdLst>
-    <p:sldId id="256" r:id="rId2"/>
-    <p:sldId id="257" r:id="rId3"/>
-    <p:sldId id="258" r:id="rId4"/>
-    <p:sldId id="259" r:id="rId5"/>
-    <p:sldId id="260" r:id="rId6"/>
-    <p:sldId id="261" r:id="rId7"/>
-    <p:sldId id="263" r:id="rId8"/>
-    <p:sldId id="262" r:id="rId9"/>
+    <p:sldId id="264" r:id="rId2"/>
+    <p:sldId id="256" r:id="rId3"/>
+    <p:sldId id="257" r:id="rId4"/>
+    <p:sldId id="258" r:id="rId5"/>
+    <p:sldId id="259" r:id="rId6"/>
+    <p:sldId id="260" r:id="rId7"/>
+    <p:sldId id="261" r:id="rId8"/>
+    <p:sldId id="263" r:id="rId9"/>
+    <p:sldId id="262" r:id="rId10"/>
   </p:sldIdLst>
   <p:sldSz cx="12192000" cy="6858000"/>
   <p:notesSz cx="6858000" cy="9144000"/>
@@ -250,7 +251,7 @@
           <a:p>
             <a:fld id="{B122ED85-74D0-44F3-A1C0-0501CFE3C0D8}" type="datetimeFigureOut">
               <a:rPr lang="ko-KR" altLang="en-US" smtClean="0"/>
-              <a:t>2020-07-22</a:t>
+              <a:t>2020-08-04</a:t>
             </a:fld>
             <a:endParaRPr lang="ko-KR" altLang="en-US"/>
           </a:p>
@@ -420,7 +421,7 @@
           <a:p>
             <a:fld id="{B122ED85-74D0-44F3-A1C0-0501CFE3C0D8}" type="datetimeFigureOut">
               <a:rPr lang="ko-KR" altLang="en-US" smtClean="0"/>
-              <a:t>2020-07-22</a:t>
+              <a:t>2020-08-04</a:t>
             </a:fld>
             <a:endParaRPr lang="ko-KR" altLang="en-US"/>
           </a:p>
@@ -600,7 +601,7 @@
           <a:p>
             <a:fld id="{B122ED85-74D0-44F3-A1C0-0501CFE3C0D8}" type="datetimeFigureOut">
               <a:rPr lang="ko-KR" altLang="en-US" smtClean="0"/>
-              <a:t>2020-07-22</a:t>
+              <a:t>2020-08-04</a:t>
             </a:fld>
             <a:endParaRPr lang="ko-KR" altLang="en-US"/>
           </a:p>
@@ -770,7 +771,7 @@
           <a:p>
             <a:fld id="{B122ED85-74D0-44F3-A1C0-0501CFE3C0D8}" type="datetimeFigureOut">
               <a:rPr lang="ko-KR" altLang="en-US" smtClean="0"/>
-              <a:t>2020-07-22</a:t>
+              <a:t>2020-08-04</a:t>
             </a:fld>
             <a:endParaRPr lang="ko-KR" altLang="en-US"/>
           </a:p>
@@ -1016,7 +1017,7 @@
           <a:p>
             <a:fld id="{B122ED85-74D0-44F3-A1C0-0501CFE3C0D8}" type="datetimeFigureOut">
               <a:rPr lang="ko-KR" altLang="en-US" smtClean="0"/>
-              <a:t>2020-07-22</a:t>
+              <a:t>2020-08-04</a:t>
             </a:fld>
             <a:endParaRPr lang="ko-KR" altLang="en-US"/>
           </a:p>
@@ -1248,7 +1249,7 @@
           <a:p>
             <a:fld id="{B122ED85-74D0-44F3-A1C0-0501CFE3C0D8}" type="datetimeFigureOut">
               <a:rPr lang="ko-KR" altLang="en-US" smtClean="0"/>
-              <a:t>2020-07-22</a:t>
+              <a:t>2020-08-04</a:t>
             </a:fld>
             <a:endParaRPr lang="ko-KR" altLang="en-US"/>
           </a:p>
@@ -1615,7 +1616,7 @@
           <a:p>
             <a:fld id="{B122ED85-74D0-44F3-A1C0-0501CFE3C0D8}" type="datetimeFigureOut">
               <a:rPr lang="ko-KR" altLang="en-US" smtClean="0"/>
-              <a:t>2020-07-22</a:t>
+              <a:t>2020-08-04</a:t>
             </a:fld>
             <a:endParaRPr lang="ko-KR" altLang="en-US"/>
           </a:p>
@@ -1733,7 +1734,7 @@
           <a:p>
             <a:fld id="{B122ED85-74D0-44F3-A1C0-0501CFE3C0D8}" type="datetimeFigureOut">
               <a:rPr lang="ko-KR" altLang="en-US" smtClean="0"/>
-              <a:t>2020-07-22</a:t>
+              <a:t>2020-08-04</a:t>
             </a:fld>
             <a:endParaRPr lang="ko-KR" altLang="en-US"/>
           </a:p>
@@ -1828,7 +1829,7 @@
           <a:p>
             <a:fld id="{B122ED85-74D0-44F3-A1C0-0501CFE3C0D8}" type="datetimeFigureOut">
               <a:rPr lang="ko-KR" altLang="en-US" smtClean="0"/>
-              <a:t>2020-07-22</a:t>
+              <a:t>2020-08-04</a:t>
             </a:fld>
             <a:endParaRPr lang="ko-KR" altLang="en-US"/>
           </a:p>
@@ -2105,7 +2106,7 @@
           <a:p>
             <a:fld id="{B122ED85-74D0-44F3-A1C0-0501CFE3C0D8}" type="datetimeFigureOut">
               <a:rPr lang="ko-KR" altLang="en-US" smtClean="0"/>
-              <a:t>2020-07-22</a:t>
+              <a:t>2020-08-04</a:t>
             </a:fld>
             <a:endParaRPr lang="ko-KR" altLang="en-US"/>
           </a:p>
@@ -2358,7 +2359,7 @@
           <a:p>
             <a:fld id="{B122ED85-74D0-44F3-A1C0-0501CFE3C0D8}" type="datetimeFigureOut">
               <a:rPr lang="ko-KR" altLang="en-US" smtClean="0"/>
-              <a:t>2020-07-22</a:t>
+              <a:t>2020-08-04</a:t>
             </a:fld>
             <a:endParaRPr lang="ko-KR" altLang="en-US"/>
           </a:p>
@@ -2571,7 +2572,7 @@
           <a:p>
             <a:fld id="{B122ED85-74D0-44F3-A1C0-0501CFE3C0D8}" type="datetimeFigureOut">
               <a:rPr lang="ko-KR" altLang="en-US" smtClean="0"/>
-              <a:t>2020-07-22</a:t>
+              <a:t>2020-08-04</a:t>
             </a:fld>
             <a:endParaRPr lang="ko-KR" altLang="en-US"/>
           </a:p>
@@ -2978,6 +2979,746 @@
       </p:grpSpPr>
       <p:sp>
         <p:nvSpPr>
+          <p:cNvPr id="2" name="모서리가 둥근 직사각형 1"/>
+          <p:cNvSpPr/>
+          <p:nvPr/>
+        </p:nvSpPr>
+        <p:spPr>
+          <a:xfrm>
+            <a:off x="3724831" y="4195480"/>
+            <a:ext cx="2366684" cy="1754842"/>
+          </a:xfrm>
+          <a:prstGeom prst="roundRect">
+            <a:avLst/>
+          </a:prstGeom>
+        </p:spPr>
+        <p:style>
+          <a:lnRef idx="2">
+            <a:schemeClr val="dk1"/>
+          </a:lnRef>
+          <a:fillRef idx="1">
+            <a:schemeClr val="lt1"/>
+          </a:fillRef>
+          <a:effectRef idx="0">
+            <a:schemeClr val="dk1"/>
+          </a:effectRef>
+          <a:fontRef idx="minor">
+            <a:schemeClr val="dk1"/>
+          </a:fontRef>
+        </p:style>
+        <p:txBody>
+          <a:bodyPr rot="0" spcFirstLastPara="0" vertOverflow="overflow" horzOverflow="overflow" vert="horz" wrap="square" lIns="0" tIns="36000" rIns="0" bIns="36000" numCol="1" spcCol="0" rtlCol="0" fromWordArt="0" anchor="ctr" anchorCtr="0" forceAA="0" compatLnSpc="1">
+            <a:prstTxWarp prst="textNoShape">
+              <a:avLst/>
+            </a:prstTxWarp>
+            <a:noAutofit/>
+          </a:bodyPr>
+          <a:lstStyle/>
+          <a:p>
+            <a:pPr algn="ctr"/>
+            <a:r>
+              <a:rPr lang="en-US" altLang="ko-KR" sz="1000" dirty="0" err="1" smtClean="0"/>
+              <a:t>OSPIcicle</a:t>
+            </a:r>
+            <a:endParaRPr lang="en-US" altLang="ko-KR" sz="1000" dirty="0" smtClean="0"/>
+          </a:p>
+          <a:p>
+            <a:pPr algn="ctr"/>
+            <a:r>
+              <a:rPr lang="ko-KR" altLang="en-US" sz="1000" dirty="0" smtClean="0"/>
+              <a:t>파일서버엔진</a:t>
+            </a:r>
+            <a:endParaRPr lang="en-US" altLang="ko-KR" sz="1000" dirty="0" smtClean="0"/>
+          </a:p>
+          <a:p>
+            <a:pPr marL="171450" indent="-171450">
+              <a:buFont typeface="Arial" panose="020B0604020202020204" pitchFamily="34" charset="0"/>
+              <a:buChar char="•"/>
+            </a:pPr>
+            <a:r>
+              <a:rPr lang="ko-KR" altLang="en-US" sz="1000" dirty="0" smtClean="0"/>
+              <a:t>포털</a:t>
+            </a:r>
+            <a:r>
+              <a:rPr lang="en-US" altLang="ko-KR" sz="1000" dirty="0" smtClean="0"/>
+              <a:t> </a:t>
+            </a:r>
+            <a:r>
+              <a:rPr lang="ko-KR" altLang="en-US" sz="1000" dirty="0" smtClean="0"/>
+              <a:t>파일 저장</a:t>
+            </a:r>
+            <a:endParaRPr lang="en-US" altLang="ko-KR" sz="1000" dirty="0" smtClean="0"/>
+          </a:p>
+          <a:p>
+            <a:pPr marL="171450" indent="-171450">
+              <a:buFont typeface="Arial" panose="020B0604020202020204" pitchFamily="34" charset="0"/>
+              <a:buChar char="•"/>
+            </a:pPr>
+            <a:r>
+              <a:rPr lang="ko-KR" altLang="en-US" sz="1000" dirty="0" smtClean="0"/>
+              <a:t>클러스터 별 </a:t>
+            </a:r>
+            <a:r>
+              <a:rPr lang="ko-KR" altLang="en-US" sz="1000" dirty="0" err="1"/>
+              <a:t>앱</a:t>
+            </a:r>
+            <a:r>
+              <a:rPr lang="ko-KR" altLang="en-US" sz="1000" dirty="0" smtClean="0"/>
+              <a:t> 저장</a:t>
+            </a:r>
+            <a:endParaRPr lang="en-US" altLang="ko-KR" sz="1000" dirty="0" smtClean="0"/>
+          </a:p>
+          <a:p>
+            <a:pPr marL="171450" indent="-171450">
+              <a:buFont typeface="Arial" panose="020B0604020202020204" pitchFamily="34" charset="0"/>
+              <a:buChar char="•"/>
+            </a:pPr>
+            <a:r>
+              <a:rPr lang="ko-KR" altLang="en-US" sz="1000" dirty="0" err="1" smtClean="0"/>
+              <a:t>잡</a:t>
+            </a:r>
+            <a:r>
+              <a:rPr lang="en-US" altLang="ko-KR" sz="1000" dirty="0" smtClean="0"/>
+              <a:t> </a:t>
+            </a:r>
+            <a:r>
+              <a:rPr lang="ko-KR" altLang="en-US" sz="1000" dirty="0" err="1" smtClean="0"/>
+              <a:t>실행시</a:t>
+            </a:r>
+            <a:r>
+              <a:rPr lang="ko-KR" altLang="en-US" sz="1000" dirty="0" smtClean="0"/>
+              <a:t> 입력파일 업로드</a:t>
+            </a:r>
+            <a:endParaRPr lang="en-US" altLang="ko-KR" sz="1000" dirty="0" smtClean="0"/>
+          </a:p>
+          <a:p>
+            <a:pPr marL="171450" indent="-171450">
+              <a:buFont typeface="Arial" panose="020B0604020202020204" pitchFamily="34" charset="0"/>
+              <a:buChar char="•"/>
+            </a:pPr>
+            <a:r>
+              <a:rPr lang="ko-KR" altLang="en-US" sz="1000" dirty="0" err="1" smtClean="0"/>
+              <a:t>잡</a:t>
+            </a:r>
+            <a:r>
+              <a:rPr lang="ko-KR" altLang="en-US" sz="1000" dirty="0" smtClean="0"/>
+              <a:t> 수행도중 로그파일 다운로드</a:t>
+            </a:r>
+            <a:endParaRPr lang="en-US" altLang="ko-KR" sz="1000" dirty="0" smtClean="0"/>
+          </a:p>
+          <a:p>
+            <a:pPr marL="171450" indent="-171450">
+              <a:buFont typeface="Arial" panose="020B0604020202020204" pitchFamily="34" charset="0"/>
+              <a:buChar char="•"/>
+            </a:pPr>
+            <a:r>
+              <a:rPr lang="ko-KR" altLang="en-US" sz="1000" dirty="0" err="1" smtClean="0"/>
+              <a:t>잡</a:t>
+            </a:r>
+            <a:r>
+              <a:rPr lang="ko-KR" altLang="en-US" sz="1000" dirty="0" smtClean="0"/>
+              <a:t> 수행 후 출력파일 다운로드</a:t>
+            </a:r>
+            <a:endParaRPr lang="ko-KR" altLang="en-US" sz="1000" dirty="0" smtClean="0"/>
+          </a:p>
+        </p:txBody>
+      </p:sp>
+      <p:sp>
+        <p:nvSpPr>
+          <p:cNvPr id="3" name="모서리가 둥근 직사각형 2"/>
+          <p:cNvSpPr/>
+          <p:nvPr/>
+        </p:nvSpPr>
+        <p:spPr>
+          <a:xfrm>
+            <a:off x="4128245" y="3009896"/>
+            <a:ext cx="1559859" cy="551330"/>
+          </a:xfrm>
+          <a:prstGeom prst="roundRect">
+            <a:avLst/>
+          </a:prstGeom>
+        </p:spPr>
+        <p:style>
+          <a:lnRef idx="2">
+            <a:schemeClr val="dk1"/>
+          </a:lnRef>
+          <a:fillRef idx="1">
+            <a:schemeClr val="lt1"/>
+          </a:fillRef>
+          <a:effectRef idx="0">
+            <a:schemeClr val="dk1"/>
+          </a:effectRef>
+          <a:fontRef idx="minor">
+            <a:schemeClr val="dk1"/>
+          </a:fontRef>
+        </p:style>
+        <p:txBody>
+          <a:bodyPr rot="0" spcFirstLastPara="0" vertOverflow="overflow" horzOverflow="overflow" vert="horz" wrap="square" lIns="0" tIns="36000" rIns="0" bIns="36000" numCol="1" spcCol="0" rtlCol="0" fromWordArt="0" anchor="ctr" anchorCtr="0" forceAA="0" compatLnSpc="1">
+            <a:prstTxWarp prst="textNoShape">
+              <a:avLst/>
+            </a:prstTxWarp>
+            <a:noAutofit/>
+          </a:bodyPr>
+          <a:lstStyle/>
+          <a:p>
+            <a:pPr algn="ctr"/>
+            <a:r>
+              <a:rPr lang="en-US" altLang="ko-KR" sz="1000" dirty="0" err="1" smtClean="0"/>
+              <a:t>OSPIcebreaker</a:t>
+            </a:r>
+            <a:endParaRPr lang="en-US" altLang="ko-KR" sz="1000" dirty="0" smtClean="0"/>
+          </a:p>
+          <a:p>
+            <a:pPr algn="ctr"/>
+            <a:r>
+              <a:rPr lang="ko-KR" altLang="en-US" sz="1000" dirty="0" smtClean="0"/>
+              <a:t>클러스터</a:t>
+            </a:r>
+            <a:r>
+              <a:rPr lang="en-US" altLang="ko-KR" sz="1000" dirty="0" smtClean="0"/>
+              <a:t>/</a:t>
+            </a:r>
+            <a:r>
+              <a:rPr lang="ko-KR" altLang="en-US" sz="1000" dirty="0" err="1" smtClean="0"/>
+              <a:t>잡</a:t>
+            </a:r>
+            <a:r>
+              <a:rPr lang="ko-KR" altLang="en-US" sz="1000" dirty="0" smtClean="0"/>
+              <a:t> </a:t>
+            </a:r>
+            <a:r>
+              <a:rPr lang="ko-KR" altLang="en-US" sz="1000" dirty="0"/>
+              <a:t>관리 엔진</a:t>
+            </a:r>
+            <a:endParaRPr lang="ko-KR" altLang="en-US" sz="1000" dirty="0" smtClean="0"/>
+          </a:p>
+        </p:txBody>
+      </p:sp>
+      <p:sp>
+        <p:nvSpPr>
+          <p:cNvPr id="4" name="모서리가 둥근 직사각형 3"/>
+          <p:cNvSpPr/>
+          <p:nvPr/>
+        </p:nvSpPr>
+        <p:spPr>
+          <a:xfrm>
+            <a:off x="2250140" y="3000932"/>
+            <a:ext cx="1559859" cy="551330"/>
+          </a:xfrm>
+          <a:prstGeom prst="roundRect">
+            <a:avLst/>
+          </a:prstGeom>
+        </p:spPr>
+        <p:style>
+          <a:lnRef idx="2">
+            <a:schemeClr val="dk1"/>
+          </a:lnRef>
+          <a:fillRef idx="1">
+            <a:schemeClr val="lt1"/>
+          </a:fillRef>
+          <a:effectRef idx="0">
+            <a:schemeClr val="dk1"/>
+          </a:effectRef>
+          <a:fontRef idx="minor">
+            <a:schemeClr val="dk1"/>
+          </a:fontRef>
+        </p:style>
+        <p:txBody>
+          <a:bodyPr rot="0" spcFirstLastPara="0" vertOverflow="overflow" horzOverflow="overflow" vert="horz" wrap="square" lIns="0" tIns="36000" rIns="0" bIns="36000" numCol="1" spcCol="0" rtlCol="0" fromWordArt="0" anchor="ctr" anchorCtr="0" forceAA="0" compatLnSpc="1">
+            <a:prstTxWarp prst="textNoShape">
+              <a:avLst/>
+            </a:prstTxWarp>
+            <a:noAutofit/>
+          </a:bodyPr>
+          <a:lstStyle/>
+          <a:p>
+            <a:pPr algn="ctr"/>
+            <a:r>
+              <a:rPr lang="en-US" altLang="ko-KR" sz="1000" dirty="0" err="1" smtClean="0"/>
+              <a:t>OSPSpyglass</a:t>
+            </a:r>
+            <a:endParaRPr lang="en-US" altLang="ko-KR" sz="1000" dirty="0" smtClean="0"/>
+          </a:p>
+          <a:p>
+            <a:pPr algn="ctr"/>
+            <a:r>
+              <a:rPr lang="ko-KR" altLang="en-US" sz="1000" dirty="0" err="1" smtClean="0"/>
+              <a:t>사이언스앱</a:t>
+            </a:r>
+            <a:r>
+              <a:rPr lang="ko-KR" altLang="en-US" sz="1000" dirty="0" smtClean="0"/>
+              <a:t> 관리 엔진</a:t>
+            </a:r>
+            <a:endParaRPr lang="ko-KR" altLang="en-US" sz="1000" dirty="0" smtClean="0"/>
+          </a:p>
+        </p:txBody>
+      </p:sp>
+      <p:sp>
+        <p:nvSpPr>
+          <p:cNvPr id="5" name="모서리가 둥근 직사각형 4"/>
+          <p:cNvSpPr/>
+          <p:nvPr/>
+        </p:nvSpPr>
+        <p:spPr>
+          <a:xfrm>
+            <a:off x="6008586" y="3009896"/>
+            <a:ext cx="1559859" cy="551330"/>
+          </a:xfrm>
+          <a:prstGeom prst="roundRect">
+            <a:avLst/>
+          </a:prstGeom>
+        </p:spPr>
+        <p:style>
+          <a:lnRef idx="2">
+            <a:schemeClr val="dk1"/>
+          </a:lnRef>
+          <a:fillRef idx="1">
+            <a:schemeClr val="lt1"/>
+          </a:fillRef>
+          <a:effectRef idx="0">
+            <a:schemeClr val="dk1"/>
+          </a:effectRef>
+          <a:fontRef idx="minor">
+            <a:schemeClr val="dk1"/>
+          </a:fontRef>
+        </p:style>
+        <p:txBody>
+          <a:bodyPr rot="0" spcFirstLastPara="0" vertOverflow="overflow" horzOverflow="overflow" vert="horz" wrap="square" lIns="0" tIns="36000" rIns="0" bIns="36000" numCol="1" spcCol="0" rtlCol="0" fromWordArt="0" anchor="ctr" anchorCtr="0" forceAA="0" compatLnSpc="1">
+            <a:prstTxWarp prst="textNoShape">
+              <a:avLst/>
+            </a:prstTxWarp>
+            <a:noAutofit/>
+          </a:bodyPr>
+          <a:lstStyle/>
+          <a:p>
+            <a:pPr algn="ctr"/>
+            <a:r>
+              <a:rPr lang="en-US" altLang="ko-KR" sz="1000" dirty="0" err="1" smtClean="0"/>
+              <a:t>OSPIcecap</a:t>
+            </a:r>
+            <a:endParaRPr lang="en-US" altLang="ko-KR" sz="1000" dirty="0" smtClean="0"/>
+          </a:p>
+          <a:p>
+            <a:pPr algn="ctr"/>
+            <a:r>
+              <a:rPr lang="ko-KR" altLang="en-US" sz="1000" dirty="0" smtClean="0"/>
+              <a:t>데이터 </a:t>
+            </a:r>
+            <a:r>
+              <a:rPr lang="ko-KR" altLang="en-US" sz="1000" dirty="0"/>
+              <a:t>관리 엔진</a:t>
+            </a:r>
+            <a:endParaRPr lang="ko-KR" altLang="en-US" sz="1000" dirty="0" smtClean="0"/>
+          </a:p>
+        </p:txBody>
+      </p:sp>
+      <p:sp>
+        <p:nvSpPr>
+          <p:cNvPr id="7" name="모서리가 둥근 직사각형 6"/>
+          <p:cNvSpPr/>
+          <p:nvPr/>
+        </p:nvSpPr>
+        <p:spPr>
+          <a:xfrm>
+            <a:off x="4128244" y="1824312"/>
+            <a:ext cx="1559859" cy="551330"/>
+          </a:xfrm>
+          <a:prstGeom prst="roundRect">
+            <a:avLst/>
+          </a:prstGeom>
+        </p:spPr>
+        <p:style>
+          <a:lnRef idx="2">
+            <a:schemeClr val="dk1"/>
+          </a:lnRef>
+          <a:fillRef idx="1">
+            <a:schemeClr val="lt1"/>
+          </a:fillRef>
+          <a:effectRef idx="0">
+            <a:schemeClr val="dk1"/>
+          </a:effectRef>
+          <a:fontRef idx="minor">
+            <a:schemeClr val="dk1"/>
+          </a:fontRef>
+        </p:style>
+        <p:txBody>
+          <a:bodyPr rot="0" spcFirstLastPara="0" vertOverflow="overflow" horzOverflow="overflow" vert="horz" wrap="square" lIns="0" tIns="36000" rIns="0" bIns="36000" numCol="1" spcCol="0" rtlCol="0" fromWordArt="0" anchor="ctr" anchorCtr="0" forceAA="0" compatLnSpc="1">
+            <a:prstTxWarp prst="textNoShape">
+              <a:avLst/>
+            </a:prstTxWarp>
+            <a:noAutofit/>
+          </a:bodyPr>
+          <a:lstStyle/>
+          <a:p>
+            <a:pPr algn="ctr"/>
+            <a:r>
+              <a:rPr lang="en-US" altLang="ko-KR" sz="1000" dirty="0" err="1" smtClean="0"/>
+              <a:t>OSPZodiac</a:t>
+            </a:r>
+            <a:endParaRPr lang="en-US" altLang="ko-KR" sz="1000" dirty="0" smtClean="0"/>
+          </a:p>
+          <a:p>
+            <a:pPr algn="ctr"/>
+            <a:r>
+              <a:rPr lang="ko-KR" altLang="en-US" sz="1000" dirty="0" smtClean="0"/>
+              <a:t>시뮬레이션 </a:t>
+            </a:r>
+            <a:r>
+              <a:rPr lang="ko-KR" altLang="en-US" sz="1000" dirty="0"/>
+              <a:t>엔진</a:t>
+            </a:r>
+            <a:endParaRPr lang="ko-KR" altLang="en-US" sz="1000" dirty="0" smtClean="0"/>
+          </a:p>
+        </p:txBody>
+      </p:sp>
+      <p:sp>
+        <p:nvSpPr>
+          <p:cNvPr id="8" name="모서리가 둥근 직사각형 7"/>
+          <p:cNvSpPr/>
+          <p:nvPr/>
+        </p:nvSpPr>
+        <p:spPr>
+          <a:xfrm>
+            <a:off x="9034180" y="2104461"/>
+            <a:ext cx="1559859" cy="551330"/>
+          </a:xfrm>
+          <a:prstGeom prst="roundRect">
+            <a:avLst/>
+          </a:prstGeom>
+        </p:spPr>
+        <p:style>
+          <a:lnRef idx="2">
+            <a:schemeClr val="dk1"/>
+          </a:lnRef>
+          <a:fillRef idx="1">
+            <a:schemeClr val="lt1"/>
+          </a:fillRef>
+          <a:effectRef idx="0">
+            <a:schemeClr val="dk1"/>
+          </a:effectRef>
+          <a:fontRef idx="minor">
+            <a:schemeClr val="dk1"/>
+          </a:fontRef>
+        </p:style>
+        <p:txBody>
+          <a:bodyPr rot="0" spcFirstLastPara="0" vertOverflow="overflow" horzOverflow="overflow" vert="horz" wrap="square" lIns="0" tIns="36000" rIns="0" bIns="36000" numCol="1" spcCol="0" rtlCol="0" fromWordArt="0" anchor="ctr" anchorCtr="0" forceAA="0" compatLnSpc="1">
+            <a:prstTxWarp prst="textNoShape">
+              <a:avLst/>
+            </a:prstTxWarp>
+            <a:noAutofit/>
+          </a:bodyPr>
+          <a:lstStyle/>
+          <a:p>
+            <a:pPr algn="ctr"/>
+            <a:r>
+              <a:rPr lang="en-US" altLang="ko-KR" sz="1000" dirty="0" err="1" smtClean="0"/>
+              <a:t>OSPMeridian</a:t>
+            </a:r>
+            <a:endParaRPr lang="en-US" altLang="ko-KR" sz="1000" dirty="0" smtClean="0"/>
+          </a:p>
+          <a:p>
+            <a:pPr algn="ctr"/>
+            <a:r>
+              <a:rPr lang="ko-KR" altLang="en-US" sz="1000" dirty="0" smtClean="0"/>
+              <a:t>가상교육 </a:t>
+            </a:r>
+            <a:r>
+              <a:rPr lang="ko-KR" altLang="en-US" sz="1000" dirty="0"/>
+              <a:t>엔진</a:t>
+            </a:r>
+            <a:endParaRPr lang="ko-KR" altLang="en-US" sz="1000" dirty="0" smtClean="0"/>
+          </a:p>
+        </p:txBody>
+      </p:sp>
+      <p:sp>
+        <p:nvSpPr>
+          <p:cNvPr id="9" name="모서리가 둥근 직사각형 8"/>
+          <p:cNvSpPr/>
+          <p:nvPr/>
+        </p:nvSpPr>
+        <p:spPr>
+          <a:xfrm>
+            <a:off x="9034180" y="3009896"/>
+            <a:ext cx="1559859" cy="551330"/>
+          </a:xfrm>
+          <a:prstGeom prst="roundRect">
+            <a:avLst/>
+          </a:prstGeom>
+        </p:spPr>
+        <p:style>
+          <a:lnRef idx="2">
+            <a:schemeClr val="dk1"/>
+          </a:lnRef>
+          <a:fillRef idx="1">
+            <a:schemeClr val="lt1"/>
+          </a:fillRef>
+          <a:effectRef idx="0">
+            <a:schemeClr val="dk1"/>
+          </a:effectRef>
+          <a:fontRef idx="minor">
+            <a:schemeClr val="dk1"/>
+          </a:fontRef>
+        </p:style>
+        <p:txBody>
+          <a:bodyPr rot="0" spcFirstLastPara="0" vertOverflow="overflow" horzOverflow="overflow" vert="horz" wrap="square" lIns="0" tIns="36000" rIns="0" bIns="36000" numCol="1" spcCol="0" rtlCol="0" fromWordArt="0" anchor="ctr" anchorCtr="0" forceAA="0" compatLnSpc="1">
+            <a:prstTxWarp prst="textNoShape">
+              <a:avLst/>
+            </a:prstTxWarp>
+            <a:noAutofit/>
+          </a:bodyPr>
+          <a:lstStyle/>
+          <a:p>
+            <a:pPr algn="ctr"/>
+            <a:r>
+              <a:rPr lang="en-US" altLang="ko-KR" sz="1000" dirty="0" err="1" smtClean="0"/>
+              <a:t>OSPIceberg</a:t>
+            </a:r>
+            <a:endParaRPr lang="en-US" altLang="ko-KR" sz="1000" dirty="0" smtClean="0"/>
+          </a:p>
+          <a:p>
+            <a:pPr algn="ctr"/>
+            <a:r>
+              <a:rPr lang="ko-KR" altLang="en-US" sz="1000" dirty="0" smtClean="0"/>
+              <a:t>정보관리 </a:t>
+            </a:r>
+            <a:r>
+              <a:rPr lang="ko-KR" altLang="en-US" sz="1000" dirty="0"/>
+              <a:t>엔진</a:t>
+            </a:r>
+            <a:endParaRPr lang="ko-KR" altLang="en-US" sz="1000" dirty="0" smtClean="0"/>
+          </a:p>
+        </p:txBody>
+      </p:sp>
+      <p:cxnSp>
+        <p:nvCxnSpPr>
+          <p:cNvPr id="11" name="직선 연결선 10"/>
+          <p:cNvCxnSpPr>
+            <a:stCxn id="7" idx="2"/>
+            <a:endCxn id="4" idx="0"/>
+          </p:cNvCxnSpPr>
+          <p:nvPr/>
+        </p:nvCxnSpPr>
+        <p:spPr>
+          <a:xfrm flipH="1">
+            <a:off x="3030070" y="2375642"/>
+            <a:ext cx="1878104" cy="625290"/>
+          </a:xfrm>
+          <a:prstGeom prst="line">
+            <a:avLst/>
+          </a:prstGeom>
+        </p:spPr>
+        <p:style>
+          <a:lnRef idx="1">
+            <a:schemeClr val="accent1"/>
+          </a:lnRef>
+          <a:fillRef idx="0">
+            <a:schemeClr val="accent1"/>
+          </a:fillRef>
+          <a:effectRef idx="0">
+            <a:schemeClr val="accent1"/>
+          </a:effectRef>
+          <a:fontRef idx="minor">
+            <a:schemeClr val="tx1"/>
+          </a:fontRef>
+        </p:style>
+      </p:cxnSp>
+      <p:cxnSp>
+        <p:nvCxnSpPr>
+          <p:cNvPr id="13" name="직선 연결선 12"/>
+          <p:cNvCxnSpPr>
+            <a:stCxn id="7" idx="2"/>
+            <a:endCxn id="3" idx="0"/>
+          </p:cNvCxnSpPr>
+          <p:nvPr/>
+        </p:nvCxnSpPr>
+        <p:spPr>
+          <a:xfrm>
+            <a:off x="4908174" y="2375642"/>
+            <a:ext cx="1" cy="634254"/>
+          </a:xfrm>
+          <a:prstGeom prst="line">
+            <a:avLst/>
+          </a:prstGeom>
+        </p:spPr>
+        <p:style>
+          <a:lnRef idx="1">
+            <a:schemeClr val="accent1"/>
+          </a:lnRef>
+          <a:fillRef idx="0">
+            <a:schemeClr val="accent1"/>
+          </a:fillRef>
+          <a:effectRef idx="0">
+            <a:schemeClr val="accent1"/>
+          </a:effectRef>
+          <a:fontRef idx="minor">
+            <a:schemeClr val="tx1"/>
+          </a:fontRef>
+        </p:style>
+      </p:cxnSp>
+      <p:cxnSp>
+        <p:nvCxnSpPr>
+          <p:cNvPr id="15" name="직선 연결선 14"/>
+          <p:cNvCxnSpPr>
+            <a:stCxn id="7" idx="2"/>
+            <a:endCxn id="5" idx="0"/>
+          </p:cNvCxnSpPr>
+          <p:nvPr/>
+        </p:nvCxnSpPr>
+        <p:spPr>
+          <a:xfrm>
+            <a:off x="4908174" y="2375642"/>
+            <a:ext cx="1880342" cy="634254"/>
+          </a:xfrm>
+          <a:prstGeom prst="line">
+            <a:avLst/>
+          </a:prstGeom>
+        </p:spPr>
+        <p:style>
+          <a:lnRef idx="1">
+            <a:schemeClr val="accent1"/>
+          </a:lnRef>
+          <a:fillRef idx="0">
+            <a:schemeClr val="accent1"/>
+          </a:fillRef>
+          <a:effectRef idx="0">
+            <a:schemeClr val="accent1"/>
+          </a:effectRef>
+          <a:fontRef idx="minor">
+            <a:schemeClr val="tx1"/>
+          </a:fontRef>
+        </p:style>
+      </p:cxnSp>
+      <p:cxnSp>
+        <p:nvCxnSpPr>
+          <p:cNvPr id="17" name="직선 연결선 16"/>
+          <p:cNvCxnSpPr>
+            <a:stCxn id="4" idx="2"/>
+            <a:endCxn id="2" idx="0"/>
+          </p:cNvCxnSpPr>
+          <p:nvPr/>
+        </p:nvCxnSpPr>
+        <p:spPr>
+          <a:xfrm>
+            <a:off x="3030070" y="3552262"/>
+            <a:ext cx="1878103" cy="643218"/>
+          </a:xfrm>
+          <a:prstGeom prst="line">
+            <a:avLst/>
+          </a:prstGeom>
+        </p:spPr>
+        <p:style>
+          <a:lnRef idx="1">
+            <a:schemeClr val="accent1"/>
+          </a:lnRef>
+          <a:fillRef idx="0">
+            <a:schemeClr val="accent1"/>
+          </a:fillRef>
+          <a:effectRef idx="0">
+            <a:schemeClr val="accent1"/>
+          </a:effectRef>
+          <a:fontRef idx="minor">
+            <a:schemeClr val="tx1"/>
+          </a:fontRef>
+        </p:style>
+      </p:cxnSp>
+      <p:cxnSp>
+        <p:nvCxnSpPr>
+          <p:cNvPr id="19" name="직선 연결선 18"/>
+          <p:cNvCxnSpPr>
+            <a:stCxn id="3" idx="2"/>
+            <a:endCxn id="2" idx="0"/>
+          </p:cNvCxnSpPr>
+          <p:nvPr/>
+        </p:nvCxnSpPr>
+        <p:spPr>
+          <a:xfrm flipH="1">
+            <a:off x="4908173" y="3561226"/>
+            <a:ext cx="2" cy="634254"/>
+          </a:xfrm>
+          <a:prstGeom prst="line">
+            <a:avLst/>
+          </a:prstGeom>
+        </p:spPr>
+        <p:style>
+          <a:lnRef idx="1">
+            <a:schemeClr val="accent1"/>
+          </a:lnRef>
+          <a:fillRef idx="0">
+            <a:schemeClr val="accent1"/>
+          </a:fillRef>
+          <a:effectRef idx="0">
+            <a:schemeClr val="accent1"/>
+          </a:effectRef>
+          <a:fontRef idx="minor">
+            <a:schemeClr val="tx1"/>
+          </a:fontRef>
+        </p:style>
+      </p:cxnSp>
+      <p:cxnSp>
+        <p:nvCxnSpPr>
+          <p:cNvPr id="21" name="직선 연결선 20"/>
+          <p:cNvCxnSpPr>
+            <a:stCxn id="5" idx="2"/>
+            <a:endCxn id="2" idx="0"/>
+          </p:cNvCxnSpPr>
+          <p:nvPr/>
+        </p:nvCxnSpPr>
+        <p:spPr>
+          <a:xfrm flipH="1">
+            <a:off x="4908173" y="3561226"/>
+            <a:ext cx="1880343" cy="634254"/>
+          </a:xfrm>
+          <a:prstGeom prst="line">
+            <a:avLst/>
+          </a:prstGeom>
+        </p:spPr>
+        <p:style>
+          <a:lnRef idx="1">
+            <a:schemeClr val="accent1"/>
+          </a:lnRef>
+          <a:fillRef idx="0">
+            <a:schemeClr val="accent1"/>
+          </a:fillRef>
+          <a:effectRef idx="0">
+            <a:schemeClr val="accent1"/>
+          </a:effectRef>
+          <a:fontRef idx="minor">
+            <a:schemeClr val="tx1"/>
+          </a:fontRef>
+        </p:style>
+      </p:cxnSp>
+    </p:spTree>
+    <p:extLst>
+      <p:ext uri="{BB962C8B-B14F-4D97-AF65-F5344CB8AC3E}">
+        <p14:creationId xmlns:p14="http://schemas.microsoft.com/office/powerpoint/2010/main" val="1344236995"/>
+      </p:ext>
+    </p:extLst>
+  </p:cSld>
+  <p:clrMapOvr>
+    <a:masterClrMapping/>
+  </p:clrMapOvr>
+</p:sld>
+</file>
+
+<file path=ppt/slides/slide2.xml><?xml version="1.0" encoding="utf-8"?>
+<p:sld xmlns:a="http://schemas.openxmlformats.org/drawingml/2006/main" xmlns:r="http://schemas.openxmlformats.org/officeDocument/2006/relationships" xmlns:p="http://schemas.openxmlformats.org/presentationml/2006/main">
+  <p:cSld>
+    <p:spTree>
+      <p:nvGrpSpPr>
+        <p:cNvPr id="1" name=""/>
+        <p:cNvGrpSpPr/>
+        <p:nvPr/>
+      </p:nvGrpSpPr>
+      <p:grpSpPr>
+        <a:xfrm>
+          <a:off x="0" y="0"/>
+          <a:ext cx="0" cy="0"/>
+          <a:chOff x="0" y="0"/>
+          <a:chExt cx="0" cy="0"/>
+        </a:xfrm>
+      </p:grpSpPr>
+      <p:sp>
+        <p:nvSpPr>
           <p:cNvPr id="4" name="직사각형 3"/>
           <p:cNvSpPr/>
           <p:nvPr/>
@@ -5432,7 +6173,7 @@
 </p:sld>
 </file>
 
-<file path=ppt/slides/slide2.xml><?xml version="1.0" encoding="utf-8"?>
+<file path=ppt/slides/slide3.xml><?xml version="1.0" encoding="utf-8"?>
 <p:sld xmlns:a="http://schemas.openxmlformats.org/drawingml/2006/main" xmlns:r="http://schemas.openxmlformats.org/officeDocument/2006/relationships" xmlns:p="http://schemas.openxmlformats.org/presentationml/2006/main">
   <p:cSld>
     <p:spTree>
@@ -8291,7 +9032,7 @@
 </p:sld>
 </file>
 
-<file path=ppt/slides/slide3.xml><?xml version="1.0" encoding="utf-8"?>
+<file path=ppt/slides/slide4.xml><?xml version="1.0" encoding="utf-8"?>
 <p:sld xmlns:a="http://schemas.openxmlformats.org/drawingml/2006/main" xmlns:r="http://schemas.openxmlformats.org/officeDocument/2006/relationships" xmlns:p="http://schemas.openxmlformats.org/presentationml/2006/main">
   <p:cSld>
     <p:spTree>
@@ -10430,7 +11171,7 @@
 </p:sld>
 </file>
 
-<file path=ppt/slides/slide4.xml><?xml version="1.0" encoding="utf-8"?>
+<file path=ppt/slides/slide5.xml><?xml version="1.0" encoding="utf-8"?>
 <p:sld xmlns:a="http://schemas.openxmlformats.org/drawingml/2006/main" xmlns:r="http://schemas.openxmlformats.org/officeDocument/2006/relationships" xmlns:p="http://schemas.openxmlformats.org/presentationml/2006/main">
   <p:cSld>
     <p:spTree>
@@ -11762,7 +12503,6 @@
               <a:rPr lang="ko-KR" altLang="en-US" sz="1000" smtClean="0"/>
               <a:t>데이터 콜렉션 삭제</a:t>
             </a:r>
-            <a:endParaRPr lang="ko-KR" altLang="en-US" sz="1000" smtClean="0"/>
           </a:p>
         </p:txBody>
       </p:sp>
@@ -11807,21 +12547,12 @@
             <a:pPr algn="ctr"/>
             <a:r>
               <a:rPr lang="ko-KR" altLang="en-US" sz="1000" smtClean="0"/>
-              <a:t>데이터 </a:t>
-            </a:r>
-            <a:r>
-              <a:rPr lang="ko-KR" altLang="en-US" sz="1000" smtClean="0"/>
-              <a:t>세트</a:t>
-            </a:r>
-            <a:r>
-              <a:rPr lang="ko-KR" altLang="en-US" sz="1000" smtClean="0"/>
-              <a:t> </a:t>
+              <a:t>데이터 세트 </a:t>
             </a:r>
             <a:r>
               <a:rPr lang="ko-KR" altLang="en-US" sz="1000" dirty="0" smtClean="0"/>
               <a:t>삭제</a:t>
             </a:r>
-            <a:endParaRPr lang="ko-KR" altLang="en-US" sz="1000" dirty="0" smtClean="0"/>
           </a:p>
         </p:txBody>
       </p:sp>
@@ -11868,7 +12599,6 @@
               <a:rPr lang="ko-KR" altLang="en-US" sz="1000" dirty="0" smtClean="0"/>
               <a:t>데이터 섹션 삭제</a:t>
             </a:r>
-            <a:endParaRPr lang="ko-KR" altLang="en-US" sz="1000" dirty="0" smtClean="0"/>
           </a:p>
         </p:txBody>
       </p:sp>
@@ -11927,7 +12657,6 @@
               <a:rPr lang="ko-KR" altLang="en-US" sz="1000" dirty="0" smtClean="0"/>
               <a:t>삭제</a:t>
             </a:r>
-            <a:endParaRPr lang="ko-KR" altLang="en-US" sz="1000" dirty="0" smtClean="0"/>
           </a:p>
         </p:txBody>
       </p:sp>
@@ -11982,7 +12711,6 @@
               <a:rPr lang="ko-KR" altLang="en-US" sz="1000" dirty="0" smtClean="0"/>
               <a:t> 삭제</a:t>
             </a:r>
-            <a:endParaRPr lang="ko-KR" altLang="en-US" sz="1000" dirty="0" smtClean="0"/>
           </a:p>
         </p:txBody>
       </p:sp>
@@ -12571,7 +13299,6 @@
               <a:rPr lang="ko-KR" altLang="en-US" sz="1000" dirty="0" smtClean="0"/>
               <a:t>레이아웃 삭제</a:t>
             </a:r>
-            <a:endParaRPr lang="ko-KR" altLang="en-US" sz="1000" dirty="0" smtClean="0"/>
           </a:p>
         </p:txBody>
       </p:sp>
@@ -12666,7 +13393,6 @@
               <a:rPr lang="ko-KR" altLang="en-US" sz="1000" dirty="0" smtClean="0"/>
               <a:t>레이아웃 삭제</a:t>
             </a:r>
-            <a:endParaRPr lang="ko-KR" altLang="en-US" sz="1000" dirty="0" smtClean="0"/>
           </a:p>
         </p:txBody>
       </p:sp>
@@ -12827,7 +13553,6 @@
               <a:rPr lang="ko-KR" altLang="en-US" sz="1000" dirty="0" smtClean="0"/>
               <a:t>레이아웃 삭제</a:t>
             </a:r>
-            <a:endParaRPr lang="ko-KR" altLang="en-US" sz="1000" dirty="0" smtClean="0"/>
           </a:p>
         </p:txBody>
       </p:sp>
@@ -12874,7 +13599,6 @@
               <a:rPr lang="ko-KR" altLang="en-US" sz="1000" dirty="0" smtClean="0"/>
               <a:t>레이아웃 삭제</a:t>
             </a:r>
-            <a:endParaRPr lang="ko-KR" altLang="en-US" sz="1000" dirty="0" smtClean="0"/>
           </a:p>
         </p:txBody>
       </p:sp>
@@ -14007,7 +14731,7 @@
 </p:sld>
 </file>
 
-<file path=ppt/slides/slide5.xml><?xml version="1.0" encoding="utf-8"?>
+<file path=ppt/slides/slide6.xml><?xml version="1.0" encoding="utf-8"?>
 <p:sld xmlns:a="http://schemas.openxmlformats.org/drawingml/2006/main" xmlns:r="http://schemas.openxmlformats.org/officeDocument/2006/relationships" xmlns:p="http://schemas.openxmlformats.org/presentationml/2006/main">
   <p:cSld>
     <p:spTree>
@@ -16397,7 +17121,7 @@
 </p:sld>
 </file>
 
-<file path=ppt/slides/slide6.xml><?xml version="1.0" encoding="utf-8"?>
+<file path=ppt/slides/slide7.xml><?xml version="1.0" encoding="utf-8"?>
 <p:sld xmlns:a="http://schemas.openxmlformats.org/drawingml/2006/main" xmlns:r="http://schemas.openxmlformats.org/officeDocument/2006/relationships" xmlns:p="http://schemas.openxmlformats.org/presentationml/2006/main">
   <p:cSld>
     <p:spTree>
@@ -18923,7 +19647,7 @@
 </p:sld>
 </file>
 
-<file path=ppt/slides/slide7.xml><?xml version="1.0" encoding="utf-8"?>
+<file path=ppt/slides/slide8.xml><?xml version="1.0" encoding="utf-8"?>
 <p:sld xmlns:a="http://schemas.openxmlformats.org/drawingml/2006/main" xmlns:r="http://schemas.openxmlformats.org/officeDocument/2006/relationships" xmlns:p="http://schemas.openxmlformats.org/presentationml/2006/main">
   <p:cSld>
     <p:spTree>
@@ -21533,7 +22257,7 @@
 </p:sld>
 </file>
 
-<file path=ppt/slides/slide8.xml><?xml version="1.0" encoding="utf-8"?>
+<file path=ppt/slides/slide9.xml><?xml version="1.0" encoding="utf-8"?>
 <p:sld xmlns:a="http://schemas.openxmlformats.org/drawingml/2006/main" xmlns:r="http://schemas.openxmlformats.org/officeDocument/2006/relationships" xmlns:p="http://schemas.openxmlformats.org/presentationml/2006/main">
   <p:cSld>
     <p:spTree>

</xml_diff>